<commit_message>
Marked certain parts in schematic for modification/discussion.
</commit_message>
<xml_diff>
--- a/hardware/PowerBoard/Misc/BlockDiagram.pptx
+++ b/hardware/PowerBoard/Misc/BlockDiagram.pptx
@@ -1544,34 +1544,34 @@
     </dgm:pt>
   </dgm:ptLst>
   <dgm:cxnLst>
+    <dgm:cxn modelId="{6B1C5618-90D7-4E8E-83BA-2078FAB00A22}" srcId="{4B3D22EF-9FB2-49EC-B452-7A67D3E513D0}" destId="{191FDAFE-3DB2-49D8-8E5A-D0D7D7EFB174}" srcOrd="0" destOrd="0" parTransId="{B6AADEFF-7F66-4768-BEA5-52E2CFC1F4D8}" sibTransId="{3979FF24-E642-45AB-90D8-CE6A8C5723E8}"/>
+    <dgm:cxn modelId="{1237377A-11A6-4374-8A96-10F7395D0139}" type="presOf" srcId="{8C5E4515-7897-4B59-BA3C-6B204E4B0B21}" destId="{9D511374-7D7B-4EC8-ADF3-F61D1EE76F2F}" srcOrd="0" destOrd="0" presId="urn:microsoft.com/office/officeart/2005/8/layout/hierarchy3"/>
+    <dgm:cxn modelId="{C7C868DA-73E0-4BB2-94FB-BBBDA42A717F}" type="presOf" srcId="{EE2F25D5-EE39-4923-9E95-DF55A2ED0CFF}" destId="{222E0677-6280-4BEE-9943-9B6567E1B4A1}" srcOrd="0" destOrd="0" presId="urn:microsoft.com/office/officeart/2005/8/layout/hierarchy3"/>
+    <dgm:cxn modelId="{3C068E3C-2325-400C-8524-A4C227816E58}" srcId="{CF92D740-E519-4C80-BD09-681CDCE4884C}" destId="{1A13F127-3FCD-4EA9-8E72-0D378A0CD30B}" srcOrd="0" destOrd="0" parTransId="{7AF9FA00-5B54-4201-A01F-CAD231CB394A}" sibTransId="{C5342E6E-F8A3-4B2F-82EB-07A2E88446D0}"/>
+    <dgm:cxn modelId="{2C9E6FA2-731B-4A8D-9EB0-319E7D66E1E3}" srcId="{184DBD5F-D07D-4F65-ACAE-77D6FCD45332}" destId="{69C617FC-B3A4-43B0-AA97-C2C55FFFDDE2}" srcOrd="0" destOrd="0" parTransId="{8C5E4515-7897-4B59-BA3C-6B204E4B0B21}" sibTransId="{7B23EE94-EAFD-4E5F-906F-186A8C1267E5}"/>
+    <dgm:cxn modelId="{BA1B77D5-688B-4985-94D6-32B31128DD92}" srcId="{184DBD5F-D07D-4F65-ACAE-77D6FCD45332}" destId="{D5FAD0EC-14BB-437C-9156-6FFEC5F68BE9}" srcOrd="2" destOrd="0" parTransId="{D45CF7C2-193C-447D-87E7-9237551A695E}" sibTransId="{8ED690BD-D1AC-4B56-A9AB-E63BC5677321}"/>
+    <dgm:cxn modelId="{81A4742A-883B-4B2F-A016-1FCCAE9EB0EB}" srcId="{1A13F127-3FCD-4EA9-8E72-0D378A0CD30B}" destId="{52463ED4-1741-47B1-A0C6-70DDE405A0F1}" srcOrd="0" destOrd="0" parTransId="{19CC21F7-C00A-4852-84CC-6120A969BB78}" sibTransId="{B27701D8-B870-484C-8B32-A93747ED2DD9}"/>
+    <dgm:cxn modelId="{90C33AE1-DB38-402E-B48C-9C06209B91B6}" type="presOf" srcId="{184DBD5F-D07D-4F65-ACAE-77D6FCD45332}" destId="{BA964914-75D2-4B0C-B728-3154E50AF5FD}" srcOrd="0" destOrd="0" presId="urn:microsoft.com/office/officeart/2005/8/layout/hierarchy3"/>
+    <dgm:cxn modelId="{AC022202-5120-4DB9-9D5E-65A5ED2556C5}" type="presOf" srcId="{95668334-1052-40BD-9BC9-ACE06B7C38EE}" destId="{B22AED20-DDE9-4F27-98ED-852D664DEE50}" srcOrd="0" destOrd="0" presId="urn:microsoft.com/office/officeart/2005/8/layout/hierarchy3"/>
+    <dgm:cxn modelId="{389F8016-17EB-4258-AF42-693E19254233}" type="presOf" srcId="{52463ED4-1741-47B1-A0C6-70DDE405A0F1}" destId="{1CB56DC1-9241-43A2-A4CC-1878E9CBC42C}" srcOrd="0" destOrd="0" presId="urn:microsoft.com/office/officeart/2005/8/layout/hierarchy3"/>
+    <dgm:cxn modelId="{9B84F2B5-D3B7-4164-ACDC-B35CF2F611EA}" type="presOf" srcId="{69C617FC-B3A4-43B0-AA97-C2C55FFFDDE2}" destId="{DC495A99-3CC3-4C44-9CD4-E19127F63245}" srcOrd="0" destOrd="0" presId="urn:microsoft.com/office/officeart/2005/8/layout/hierarchy3"/>
     <dgm:cxn modelId="{37FCB85C-DE03-4B10-BC41-E62FC3560D86}" type="presOf" srcId="{D45CF7C2-193C-447D-87E7-9237551A695E}" destId="{F7D85594-4DA5-4940-BCB2-EDEAB36F297A}" srcOrd="0" destOrd="0" presId="urn:microsoft.com/office/officeart/2005/8/layout/hierarchy3"/>
+    <dgm:cxn modelId="{1C9CA46D-C73F-4177-A570-AD0CE36FD159}" type="presOf" srcId="{184DBD5F-D07D-4F65-ACAE-77D6FCD45332}" destId="{06E93A5F-FB84-4FEE-84C8-8856C5C0DAFF}" srcOrd="1" destOrd="0" presId="urn:microsoft.com/office/officeart/2005/8/layout/hierarchy3"/>
+    <dgm:cxn modelId="{7F0020E9-B5C7-44E9-8850-1F446A5CAD19}" srcId="{CF92D740-E519-4C80-BD09-681CDCE4884C}" destId="{4B3D22EF-9FB2-49EC-B452-7A67D3E513D0}" srcOrd="2" destOrd="0" parTransId="{D5DCCF61-0F45-47ED-AD92-4ECDCDB71DD5}" sibTransId="{E7AE43D9-6909-45B0-B374-6AE5D9254D97}"/>
+    <dgm:cxn modelId="{0CC97DB0-69EA-43A8-98A5-2BB401733E98}" type="presOf" srcId="{1A13F127-3FCD-4EA9-8E72-0D378A0CD30B}" destId="{9108A091-2672-4B4A-8EC9-7BBCD1558DAF}" srcOrd="0" destOrd="0" presId="urn:microsoft.com/office/officeart/2005/8/layout/hierarchy3"/>
+    <dgm:cxn modelId="{AAE8FAF1-85F4-40B6-AD19-EC635CA47454}" type="presOf" srcId="{1A13F127-3FCD-4EA9-8E72-0D378A0CD30B}" destId="{5276D5FB-882E-4BC3-BD19-F4F82706B0E3}" srcOrd="1" destOrd="0" presId="urn:microsoft.com/office/officeart/2005/8/layout/hierarchy3"/>
+    <dgm:cxn modelId="{4E633D2E-07DC-4AF2-A617-F6BE33098971}" type="presOf" srcId="{CF92D740-E519-4C80-BD09-681CDCE4884C}" destId="{5EB09CE6-07B9-4E20-8F8B-D10BBFEF8A68}" srcOrd="0" destOrd="0" presId="urn:microsoft.com/office/officeart/2005/8/layout/hierarchy3"/>
     <dgm:cxn modelId="{659BC00C-1FB2-4347-A313-79187A08CE6C}" type="presOf" srcId="{E2216977-CA69-42CE-BA4E-659FB9DBFA81}" destId="{950149A1-B038-49CC-8E04-F0059BEBE2CB}" srcOrd="0" destOrd="0" presId="urn:microsoft.com/office/officeart/2005/8/layout/hierarchy3"/>
+    <dgm:cxn modelId="{9A836009-34E3-4A4D-BA23-1537511798EC}" type="presOf" srcId="{191FDAFE-3DB2-49D8-8E5A-D0D7D7EFB174}" destId="{8B2E1D33-2D90-409B-91CE-DB815A9F16CD}" srcOrd="0" destOrd="0" presId="urn:microsoft.com/office/officeart/2005/8/layout/hierarchy3"/>
+    <dgm:cxn modelId="{89BA454C-B8D5-4713-9ADD-A5135D9F2B19}" type="presOf" srcId="{4B3D22EF-9FB2-49EC-B452-7A67D3E513D0}" destId="{9EE9022C-A1A4-4896-812C-BF67B355D3FC}" srcOrd="0" destOrd="0" presId="urn:microsoft.com/office/officeart/2005/8/layout/hierarchy3"/>
+    <dgm:cxn modelId="{769714C3-501A-445D-B05A-44152400D50C}" type="presOf" srcId="{D5FAD0EC-14BB-437C-9156-6FFEC5F68BE9}" destId="{14BE7BAD-7DEF-4568-B44D-40A60342DD0A}" srcOrd="0" destOrd="0" presId="urn:microsoft.com/office/officeart/2005/8/layout/hierarchy3"/>
+    <dgm:cxn modelId="{B96E71F4-CC62-4B74-B920-698D87300CDB}" srcId="{4B3D22EF-9FB2-49EC-B452-7A67D3E513D0}" destId="{E2216977-CA69-42CE-BA4E-659FB9DBFA81}" srcOrd="1" destOrd="0" parTransId="{CE7A1C9F-F000-4BE9-8339-B5791C429FBD}" sibTransId="{94B847A5-7429-4E10-9477-1F37CFCF5D74}"/>
+    <dgm:cxn modelId="{EEB139A4-82D1-47FF-B43F-2744C9EB1D68}" type="presOf" srcId="{19CC21F7-C00A-4852-84CC-6120A969BB78}" destId="{D59245B4-7650-49F7-8810-877C15E6D76B}" srcOrd="0" destOrd="0" presId="urn:microsoft.com/office/officeart/2005/8/layout/hierarchy3"/>
+    <dgm:cxn modelId="{D089FC67-EDE7-421B-B53D-88E9012EAD57}" type="presOf" srcId="{4B3D22EF-9FB2-49EC-B452-7A67D3E513D0}" destId="{084B09F3-2CAB-4B90-B51B-ABD8E3716314}" srcOrd="1" destOrd="0" presId="urn:microsoft.com/office/officeart/2005/8/layout/hierarchy3"/>
+    <dgm:cxn modelId="{14B7CE8C-51BA-41C2-8EDF-323957B877BD}" srcId="{CF92D740-E519-4C80-BD09-681CDCE4884C}" destId="{184DBD5F-D07D-4F65-ACAE-77D6FCD45332}" srcOrd="1" destOrd="0" parTransId="{640E596F-5555-4717-94A5-9891CA7BAE21}" sibTransId="{1230C493-06A6-43DE-8681-20BA836CE3BC}"/>
+    <dgm:cxn modelId="{2CE03943-B1C7-46A7-AA4E-0F10FC0111D2}" type="presOf" srcId="{B6AADEFF-7F66-4768-BEA5-52E2CFC1F4D8}" destId="{A4DF48BC-C80A-40AA-8875-46B7EC62C64E}" srcOrd="0" destOrd="0" presId="urn:microsoft.com/office/officeart/2005/8/layout/hierarchy3"/>
+    <dgm:cxn modelId="{4EB48D0C-80F8-4A8F-9831-19C1EF969BD0}" type="presOf" srcId="{CE7A1C9F-F000-4BE9-8339-B5791C429FBD}" destId="{7CA3DDAE-BF88-4855-AC2F-E7A514981FE1}" srcOrd="0" destOrd="0" presId="urn:microsoft.com/office/officeart/2005/8/layout/hierarchy3"/>
     <dgm:cxn modelId="{25B52FB6-7BA1-4D6F-9E09-4DA6D987EEEA}" srcId="{184DBD5F-D07D-4F65-ACAE-77D6FCD45332}" destId="{EE2F25D5-EE39-4923-9E95-DF55A2ED0CFF}" srcOrd="1" destOrd="0" parTransId="{95668334-1052-40BD-9BC9-ACE06B7C38EE}" sibTransId="{56FB40FA-1769-4EAB-ABD7-CBBA82EAD074}"/>
-    <dgm:cxn modelId="{7F0020E9-B5C7-44E9-8850-1F446A5CAD19}" srcId="{CF92D740-E519-4C80-BD09-681CDCE4884C}" destId="{4B3D22EF-9FB2-49EC-B452-7A67D3E513D0}" srcOrd="2" destOrd="0" parTransId="{D5DCCF61-0F45-47ED-AD92-4ECDCDB71DD5}" sibTransId="{E7AE43D9-6909-45B0-B374-6AE5D9254D97}"/>
-    <dgm:cxn modelId="{AC022202-5120-4DB9-9D5E-65A5ED2556C5}" type="presOf" srcId="{95668334-1052-40BD-9BC9-ACE06B7C38EE}" destId="{B22AED20-DDE9-4F27-98ED-852D664DEE50}" srcOrd="0" destOrd="0" presId="urn:microsoft.com/office/officeart/2005/8/layout/hierarchy3"/>
-    <dgm:cxn modelId="{9A836009-34E3-4A4D-BA23-1537511798EC}" type="presOf" srcId="{191FDAFE-3DB2-49D8-8E5A-D0D7D7EFB174}" destId="{8B2E1D33-2D90-409B-91CE-DB815A9F16CD}" srcOrd="0" destOrd="0" presId="urn:microsoft.com/office/officeart/2005/8/layout/hierarchy3"/>
-    <dgm:cxn modelId="{0CC97DB0-69EA-43A8-98A5-2BB401733E98}" type="presOf" srcId="{1A13F127-3FCD-4EA9-8E72-0D378A0CD30B}" destId="{9108A091-2672-4B4A-8EC9-7BBCD1558DAF}" srcOrd="0" destOrd="0" presId="urn:microsoft.com/office/officeart/2005/8/layout/hierarchy3"/>
-    <dgm:cxn modelId="{2CE03943-B1C7-46A7-AA4E-0F10FC0111D2}" type="presOf" srcId="{B6AADEFF-7F66-4768-BEA5-52E2CFC1F4D8}" destId="{A4DF48BC-C80A-40AA-8875-46B7EC62C64E}" srcOrd="0" destOrd="0" presId="urn:microsoft.com/office/officeart/2005/8/layout/hierarchy3"/>
-    <dgm:cxn modelId="{1237377A-11A6-4374-8A96-10F7395D0139}" type="presOf" srcId="{8C5E4515-7897-4B59-BA3C-6B204E4B0B21}" destId="{9D511374-7D7B-4EC8-ADF3-F61D1EE76F2F}" srcOrd="0" destOrd="0" presId="urn:microsoft.com/office/officeart/2005/8/layout/hierarchy3"/>
-    <dgm:cxn modelId="{EEB139A4-82D1-47FF-B43F-2744C9EB1D68}" type="presOf" srcId="{19CC21F7-C00A-4852-84CC-6120A969BB78}" destId="{D59245B4-7650-49F7-8810-877C15E6D76B}" srcOrd="0" destOrd="0" presId="urn:microsoft.com/office/officeart/2005/8/layout/hierarchy3"/>
-    <dgm:cxn modelId="{BA1B77D5-688B-4985-94D6-32B31128DD92}" srcId="{184DBD5F-D07D-4F65-ACAE-77D6FCD45332}" destId="{D5FAD0EC-14BB-437C-9156-6FFEC5F68BE9}" srcOrd="2" destOrd="0" parTransId="{D45CF7C2-193C-447D-87E7-9237551A695E}" sibTransId="{8ED690BD-D1AC-4B56-A9AB-E63BC5677321}"/>
-    <dgm:cxn modelId="{D089FC67-EDE7-421B-B53D-88E9012EAD57}" type="presOf" srcId="{4B3D22EF-9FB2-49EC-B452-7A67D3E513D0}" destId="{084B09F3-2CAB-4B90-B51B-ABD8E3716314}" srcOrd="1" destOrd="0" presId="urn:microsoft.com/office/officeart/2005/8/layout/hierarchy3"/>
-    <dgm:cxn modelId="{3C068E3C-2325-400C-8524-A4C227816E58}" srcId="{CF92D740-E519-4C80-BD09-681CDCE4884C}" destId="{1A13F127-3FCD-4EA9-8E72-0D378A0CD30B}" srcOrd="0" destOrd="0" parTransId="{7AF9FA00-5B54-4201-A01F-CAD231CB394A}" sibTransId="{C5342E6E-F8A3-4B2F-82EB-07A2E88446D0}"/>
-    <dgm:cxn modelId="{81A4742A-883B-4B2F-A016-1FCCAE9EB0EB}" srcId="{1A13F127-3FCD-4EA9-8E72-0D378A0CD30B}" destId="{52463ED4-1741-47B1-A0C6-70DDE405A0F1}" srcOrd="0" destOrd="0" parTransId="{19CC21F7-C00A-4852-84CC-6120A969BB78}" sibTransId="{B27701D8-B870-484C-8B32-A93747ED2DD9}"/>
-    <dgm:cxn modelId="{AAE8FAF1-85F4-40B6-AD19-EC635CA47454}" type="presOf" srcId="{1A13F127-3FCD-4EA9-8E72-0D378A0CD30B}" destId="{5276D5FB-882E-4BC3-BD19-F4F82706B0E3}" srcOrd="1" destOrd="0" presId="urn:microsoft.com/office/officeart/2005/8/layout/hierarchy3"/>
-    <dgm:cxn modelId="{4EB48D0C-80F8-4A8F-9831-19C1EF969BD0}" type="presOf" srcId="{CE7A1C9F-F000-4BE9-8339-B5791C429FBD}" destId="{7CA3DDAE-BF88-4855-AC2F-E7A514981FE1}" srcOrd="0" destOrd="0" presId="urn:microsoft.com/office/officeart/2005/8/layout/hierarchy3"/>
-    <dgm:cxn modelId="{2C9E6FA2-731B-4A8D-9EB0-319E7D66E1E3}" srcId="{184DBD5F-D07D-4F65-ACAE-77D6FCD45332}" destId="{69C617FC-B3A4-43B0-AA97-C2C55FFFDDE2}" srcOrd="0" destOrd="0" parTransId="{8C5E4515-7897-4B59-BA3C-6B204E4B0B21}" sibTransId="{7B23EE94-EAFD-4E5F-906F-186A8C1267E5}"/>
-    <dgm:cxn modelId="{1C9CA46D-C73F-4177-A570-AD0CE36FD159}" type="presOf" srcId="{184DBD5F-D07D-4F65-ACAE-77D6FCD45332}" destId="{06E93A5F-FB84-4FEE-84C8-8856C5C0DAFF}" srcOrd="1" destOrd="0" presId="urn:microsoft.com/office/officeart/2005/8/layout/hierarchy3"/>
-    <dgm:cxn modelId="{14B7CE8C-51BA-41C2-8EDF-323957B877BD}" srcId="{CF92D740-E519-4C80-BD09-681CDCE4884C}" destId="{184DBD5F-D07D-4F65-ACAE-77D6FCD45332}" srcOrd="1" destOrd="0" parTransId="{640E596F-5555-4717-94A5-9891CA7BAE21}" sibTransId="{1230C493-06A6-43DE-8681-20BA836CE3BC}"/>
-    <dgm:cxn modelId="{769714C3-501A-445D-B05A-44152400D50C}" type="presOf" srcId="{D5FAD0EC-14BB-437C-9156-6FFEC5F68BE9}" destId="{14BE7BAD-7DEF-4568-B44D-40A60342DD0A}" srcOrd="0" destOrd="0" presId="urn:microsoft.com/office/officeart/2005/8/layout/hierarchy3"/>
-    <dgm:cxn modelId="{6B1C5618-90D7-4E8E-83BA-2078FAB00A22}" srcId="{4B3D22EF-9FB2-49EC-B452-7A67D3E513D0}" destId="{191FDAFE-3DB2-49D8-8E5A-D0D7D7EFB174}" srcOrd="0" destOrd="0" parTransId="{B6AADEFF-7F66-4768-BEA5-52E2CFC1F4D8}" sibTransId="{3979FF24-E642-45AB-90D8-CE6A8C5723E8}"/>
-    <dgm:cxn modelId="{4E633D2E-07DC-4AF2-A617-F6BE33098971}" type="presOf" srcId="{CF92D740-E519-4C80-BD09-681CDCE4884C}" destId="{5EB09CE6-07B9-4E20-8F8B-D10BBFEF8A68}" srcOrd="0" destOrd="0" presId="urn:microsoft.com/office/officeart/2005/8/layout/hierarchy3"/>
-    <dgm:cxn modelId="{C7C868DA-73E0-4BB2-94FB-BBBDA42A717F}" type="presOf" srcId="{EE2F25D5-EE39-4923-9E95-DF55A2ED0CFF}" destId="{222E0677-6280-4BEE-9943-9B6567E1B4A1}" srcOrd="0" destOrd="0" presId="urn:microsoft.com/office/officeart/2005/8/layout/hierarchy3"/>
-    <dgm:cxn modelId="{90C33AE1-DB38-402E-B48C-9C06209B91B6}" type="presOf" srcId="{184DBD5F-D07D-4F65-ACAE-77D6FCD45332}" destId="{BA964914-75D2-4B0C-B728-3154E50AF5FD}" srcOrd="0" destOrd="0" presId="urn:microsoft.com/office/officeart/2005/8/layout/hierarchy3"/>
-    <dgm:cxn modelId="{B96E71F4-CC62-4B74-B920-698D87300CDB}" srcId="{4B3D22EF-9FB2-49EC-B452-7A67D3E513D0}" destId="{E2216977-CA69-42CE-BA4E-659FB9DBFA81}" srcOrd="1" destOrd="0" parTransId="{CE7A1C9F-F000-4BE9-8339-B5791C429FBD}" sibTransId="{94B847A5-7429-4E10-9477-1F37CFCF5D74}"/>
-    <dgm:cxn modelId="{389F8016-17EB-4258-AF42-693E19254233}" type="presOf" srcId="{52463ED4-1741-47B1-A0C6-70DDE405A0F1}" destId="{1CB56DC1-9241-43A2-A4CC-1878E9CBC42C}" srcOrd="0" destOrd="0" presId="urn:microsoft.com/office/officeart/2005/8/layout/hierarchy3"/>
-    <dgm:cxn modelId="{89BA454C-B8D5-4713-9ADD-A5135D9F2B19}" type="presOf" srcId="{4B3D22EF-9FB2-49EC-B452-7A67D3E513D0}" destId="{9EE9022C-A1A4-4896-812C-BF67B355D3FC}" srcOrd="0" destOrd="0" presId="urn:microsoft.com/office/officeart/2005/8/layout/hierarchy3"/>
-    <dgm:cxn modelId="{9B84F2B5-D3B7-4164-ACDC-B35CF2F611EA}" type="presOf" srcId="{69C617FC-B3A4-43B0-AA97-C2C55FFFDDE2}" destId="{DC495A99-3CC3-4C44-9CD4-E19127F63245}" srcOrd="0" destOrd="0" presId="urn:microsoft.com/office/officeart/2005/8/layout/hierarchy3"/>
     <dgm:cxn modelId="{BB560D48-C929-4886-8456-6F55E03F6FBE}" type="presParOf" srcId="{5EB09CE6-07B9-4E20-8F8B-D10BBFEF8A68}" destId="{CF30C37E-0609-4379-AC1B-3609DAF56A6B}" srcOrd="0" destOrd="0" presId="urn:microsoft.com/office/officeart/2005/8/layout/hierarchy3"/>
     <dgm:cxn modelId="{14C0087B-B0F0-445E-A0E8-463B7645446C}" type="presParOf" srcId="{CF30C37E-0609-4379-AC1B-3609DAF56A6B}" destId="{EE9677D2-269C-451F-B5C1-B11FDB94EB65}" srcOrd="0" destOrd="0" presId="urn:microsoft.com/office/officeart/2005/8/layout/hierarchy3"/>
     <dgm:cxn modelId="{F8715430-FD9D-44B8-AA70-10AD8ECCF1AB}" type="presParOf" srcId="{EE9677D2-269C-451F-B5C1-B11FDB94EB65}" destId="{9108A091-2672-4B4A-8EC9-7BBCD1558DAF}" srcOrd="0" destOrd="0" presId="urn:microsoft.com/office/officeart/2005/8/layout/hierarchy3"/>
@@ -1604,20 +1604,1082 @@
   <dgm:whole/>
   <dgm:extLst>
     <a:ext uri="http://schemas.microsoft.com/office/drawing/2008/diagram">
-      <dsp:dataModelExt xmlns:dsp="http://schemas.microsoft.com/office/drawing/2008/diagram" xmlns="" relId="rId6" minVer="http://schemas.openxmlformats.org/drawingml/2006/diagram"/>
+      <dsp:dataModelExt xmlns:dsp="http://schemas.microsoft.com/office/drawing/2008/diagram" relId="rId6" minVer="http://schemas.openxmlformats.org/drawingml/2006/diagram"/>
     </a:ext>
   </dgm:extLst>
 </dgm:dataModel>
 </file>
 
 <file path=ppt/diagrams/drawing1.xml><?xml version="1.0" encoding="utf-8"?>
-<dsp:drawing xmlns:dgm="http://schemas.openxmlformats.org/drawingml/2006/diagram" xmlns:a="http://schemas.openxmlformats.org/drawingml/2006/main" xmlns:dsp="http://schemas.microsoft.com/office/drawing/2008/diagram">
+<dsp:drawing xmlns:dgm="http://schemas.openxmlformats.org/drawingml/2006/diagram" xmlns:dsp="http://schemas.microsoft.com/office/drawing/2008/diagram" xmlns:a="http://schemas.openxmlformats.org/drawingml/2006/main">
   <dsp:spTree>
     <dsp:nvGrpSpPr>
       <dsp:cNvPr id="0" name=""/>
       <dsp:cNvGrpSpPr/>
     </dsp:nvGrpSpPr>
     <dsp:grpSpPr/>
+    <dsp:sp modelId="{9108A091-2672-4B4A-8EC9-7BBCD1558DAF}">
+      <dsp:nvSpPr>
+        <dsp:cNvPr id="0" name=""/>
+        <dsp:cNvSpPr/>
+      </dsp:nvSpPr>
+      <dsp:spPr>
+        <a:xfrm>
+          <a:off x="412" y="6811"/>
+          <a:ext cx="966415" cy="483207"/>
+        </a:xfrm>
+        <a:prstGeom prst="roundRect">
+          <a:avLst>
+            <a:gd name="adj" fmla="val 10000"/>
+          </a:avLst>
+        </a:prstGeom>
+        <a:solidFill>
+          <a:schemeClr val="lt1">
+            <a:hueOff val="0"/>
+            <a:satOff val="0"/>
+            <a:lumOff val="0"/>
+            <a:alphaOff val="0"/>
+          </a:schemeClr>
+        </a:solidFill>
+        <a:ln w="25400" cap="flat" cmpd="sng" algn="ctr">
+          <a:solidFill>
+            <a:schemeClr val="dk1">
+              <a:shade val="80000"/>
+              <a:hueOff val="0"/>
+              <a:satOff val="0"/>
+              <a:lumOff val="0"/>
+              <a:alphaOff val="0"/>
+            </a:schemeClr>
+          </a:solidFill>
+          <a:prstDash val="solid"/>
+        </a:ln>
+        <a:effectLst/>
+      </dsp:spPr>
+      <dsp:style>
+        <a:lnRef idx="2">
+          <a:scrgbClr r="0" g="0" b="0"/>
+        </a:lnRef>
+        <a:fillRef idx="1">
+          <a:scrgbClr r="0" g="0" b="0"/>
+        </a:fillRef>
+        <a:effectRef idx="0">
+          <a:scrgbClr r="0" g="0" b="0"/>
+        </a:effectRef>
+        <a:fontRef idx="minor">
+          <a:schemeClr val="lt1"/>
+        </a:fontRef>
+      </dsp:style>
+      <dsp:txBody>
+        <a:bodyPr spcFirstLastPara="0" vert="horz" wrap="square" lIns="26670" tIns="17780" rIns="26670" bIns="17780" numCol="1" spcCol="1270" anchor="ctr" anchorCtr="0">
+          <a:noAutofit/>
+        </a:bodyPr>
+        <a:lstStyle/>
+        <a:p>
+          <a:pPr lvl="0" algn="ctr" defTabSz="622300">
+            <a:lnSpc>
+              <a:spcPct val="90000"/>
+            </a:lnSpc>
+            <a:spcBef>
+              <a:spcPct val="0"/>
+            </a:spcBef>
+            <a:spcAft>
+              <a:spcPct val="35000"/>
+            </a:spcAft>
+          </a:pPr>
+          <a:r>
+            <a:rPr lang="en-US" sz="1400" kern="1200" dirty="0" smtClean="0"/>
+            <a:t>Digital (STM)</a:t>
+          </a:r>
+          <a:endParaRPr lang="en-US" sz="1400" kern="1200" dirty="0"/>
+        </a:p>
+      </dsp:txBody>
+      <dsp:txXfrm>
+        <a:off x="14565" y="20964"/>
+        <a:ext cx="938109" cy="454901"/>
+      </dsp:txXfrm>
+    </dsp:sp>
+    <dsp:sp modelId="{D59245B4-7650-49F7-8810-877C15E6D76B}">
+      <dsp:nvSpPr>
+        <dsp:cNvPr id="0" name=""/>
+        <dsp:cNvSpPr/>
+      </dsp:nvSpPr>
+      <dsp:spPr>
+        <a:xfrm>
+          <a:off x="97054" y="490019"/>
+          <a:ext cx="96641" cy="362405"/>
+        </a:xfrm>
+        <a:custGeom>
+          <a:avLst/>
+          <a:gdLst/>
+          <a:ahLst/>
+          <a:cxnLst/>
+          <a:rect l="0" t="0" r="0" b="0"/>
+          <a:pathLst>
+            <a:path>
+              <a:moveTo>
+                <a:pt x="0" y="0"/>
+              </a:moveTo>
+              <a:lnTo>
+                <a:pt x="0" y="362405"/>
+              </a:lnTo>
+              <a:lnTo>
+                <a:pt x="96641" y="362405"/>
+              </a:lnTo>
+            </a:path>
+          </a:pathLst>
+        </a:custGeom>
+        <a:noFill/>
+        <a:ln w="25400" cap="flat" cmpd="sng" algn="ctr">
+          <a:solidFill>
+            <a:schemeClr val="dk1">
+              <a:shade val="60000"/>
+              <a:hueOff val="0"/>
+              <a:satOff val="0"/>
+              <a:lumOff val="0"/>
+              <a:alphaOff val="0"/>
+            </a:schemeClr>
+          </a:solidFill>
+          <a:prstDash val="solid"/>
+        </a:ln>
+        <a:effectLst/>
+      </dsp:spPr>
+      <dsp:style>
+        <a:lnRef idx="2">
+          <a:scrgbClr r="0" g="0" b="0"/>
+        </a:lnRef>
+        <a:fillRef idx="0">
+          <a:scrgbClr r="0" g="0" b="0"/>
+        </a:fillRef>
+        <a:effectRef idx="0">
+          <a:scrgbClr r="0" g="0" b="0"/>
+        </a:effectRef>
+        <a:fontRef idx="minor"/>
+      </dsp:style>
+    </dsp:sp>
+    <dsp:sp modelId="{1CB56DC1-9241-43A2-A4CC-1878E9CBC42C}">
+      <dsp:nvSpPr>
+        <dsp:cNvPr id="0" name=""/>
+        <dsp:cNvSpPr/>
+      </dsp:nvSpPr>
+      <dsp:spPr>
+        <a:xfrm>
+          <a:off x="193696" y="610821"/>
+          <a:ext cx="773132" cy="483207"/>
+        </a:xfrm>
+        <a:prstGeom prst="roundRect">
+          <a:avLst>
+            <a:gd name="adj" fmla="val 10000"/>
+          </a:avLst>
+        </a:prstGeom>
+        <a:solidFill>
+          <a:schemeClr val="dk1">
+            <a:alpha val="90000"/>
+            <a:tint val="40000"/>
+            <a:hueOff val="0"/>
+            <a:satOff val="0"/>
+            <a:lumOff val="0"/>
+            <a:alphaOff val="0"/>
+          </a:schemeClr>
+        </a:solidFill>
+        <a:ln w="25400" cap="flat" cmpd="sng" algn="ctr">
+          <a:solidFill>
+            <a:schemeClr val="dk1">
+              <a:hueOff val="0"/>
+              <a:satOff val="0"/>
+              <a:lumOff val="0"/>
+              <a:alphaOff val="0"/>
+            </a:schemeClr>
+          </a:solidFill>
+          <a:prstDash val="solid"/>
+        </a:ln>
+        <a:effectLst/>
+      </dsp:spPr>
+      <dsp:style>
+        <a:lnRef idx="2">
+          <a:scrgbClr r="0" g="0" b="0"/>
+        </a:lnRef>
+        <a:fillRef idx="1">
+          <a:scrgbClr r="0" g="0" b="0"/>
+        </a:fillRef>
+        <a:effectRef idx="0">
+          <a:scrgbClr r="0" g="0" b="0"/>
+        </a:effectRef>
+        <a:fontRef idx="minor"/>
+      </dsp:style>
+      <dsp:txBody>
+        <a:bodyPr spcFirstLastPara="0" vert="horz" wrap="square" lIns="26670" tIns="17780" rIns="26670" bIns="17780" numCol="1" spcCol="1270" anchor="ctr" anchorCtr="0">
+          <a:noAutofit/>
+        </a:bodyPr>
+        <a:lstStyle/>
+        <a:p>
+          <a:pPr lvl="0" algn="ctr" defTabSz="622300">
+            <a:lnSpc>
+              <a:spcPct val="90000"/>
+            </a:lnSpc>
+            <a:spcBef>
+              <a:spcPct val="0"/>
+            </a:spcBef>
+            <a:spcAft>
+              <a:spcPct val="35000"/>
+            </a:spcAft>
+          </a:pPr>
+          <a:r>
+            <a:rPr lang="en-US" sz="1400" kern="1200" dirty="0" smtClean="0"/>
+            <a:t>3.3V</a:t>
+          </a:r>
+          <a:endParaRPr lang="en-US" sz="1400" kern="1200" dirty="0"/>
+        </a:p>
+      </dsp:txBody>
+      <dsp:txXfrm>
+        <a:off x="207849" y="624974"/>
+        <a:ext cx="744826" cy="454901"/>
+      </dsp:txXfrm>
+    </dsp:sp>
+    <dsp:sp modelId="{BA964914-75D2-4B0C-B728-3154E50AF5FD}">
+      <dsp:nvSpPr>
+        <dsp:cNvPr id="0" name=""/>
+        <dsp:cNvSpPr/>
+      </dsp:nvSpPr>
+      <dsp:spPr>
+        <a:xfrm>
+          <a:off x="1208432" y="6811"/>
+          <a:ext cx="966415" cy="483207"/>
+        </a:xfrm>
+        <a:prstGeom prst="roundRect">
+          <a:avLst>
+            <a:gd name="adj" fmla="val 10000"/>
+          </a:avLst>
+        </a:prstGeom>
+        <a:solidFill>
+          <a:schemeClr val="lt1">
+            <a:hueOff val="0"/>
+            <a:satOff val="0"/>
+            <a:lumOff val="0"/>
+            <a:alphaOff val="0"/>
+          </a:schemeClr>
+        </a:solidFill>
+        <a:ln w="25400" cap="flat" cmpd="sng" algn="ctr">
+          <a:solidFill>
+            <a:schemeClr val="dk1">
+              <a:shade val="80000"/>
+              <a:hueOff val="0"/>
+              <a:satOff val="0"/>
+              <a:lumOff val="0"/>
+              <a:alphaOff val="0"/>
+            </a:schemeClr>
+          </a:solidFill>
+          <a:prstDash val="solid"/>
+        </a:ln>
+        <a:effectLst/>
+      </dsp:spPr>
+      <dsp:style>
+        <a:lnRef idx="2">
+          <a:scrgbClr r="0" g="0" b="0"/>
+        </a:lnRef>
+        <a:fillRef idx="1">
+          <a:scrgbClr r="0" g="0" b="0"/>
+        </a:fillRef>
+        <a:effectRef idx="0">
+          <a:scrgbClr r="0" g="0" b="0"/>
+        </a:effectRef>
+        <a:fontRef idx="minor">
+          <a:schemeClr val="lt1"/>
+        </a:fontRef>
+      </dsp:style>
+      <dsp:txBody>
+        <a:bodyPr spcFirstLastPara="0" vert="horz" wrap="square" lIns="26670" tIns="17780" rIns="26670" bIns="17780" numCol="1" spcCol="1270" anchor="ctr" anchorCtr="0">
+          <a:noAutofit/>
+        </a:bodyPr>
+        <a:lstStyle/>
+        <a:p>
+          <a:pPr lvl="0" algn="ctr" defTabSz="622300">
+            <a:lnSpc>
+              <a:spcPct val="90000"/>
+            </a:lnSpc>
+            <a:spcBef>
+              <a:spcPct val="0"/>
+            </a:spcBef>
+            <a:spcAft>
+              <a:spcPct val="35000"/>
+            </a:spcAft>
+          </a:pPr>
+          <a:r>
+            <a:rPr lang="en-US" sz="1400" kern="1200" dirty="0" smtClean="0"/>
+            <a:t>Digital</a:t>
+          </a:r>
+          <a:endParaRPr lang="en-US" sz="1400" kern="1200" dirty="0"/>
+        </a:p>
+      </dsp:txBody>
+      <dsp:txXfrm>
+        <a:off x="1222585" y="20964"/>
+        <a:ext cx="938109" cy="454901"/>
+      </dsp:txXfrm>
+    </dsp:sp>
+    <dsp:sp modelId="{9D511374-7D7B-4EC8-ADF3-F61D1EE76F2F}">
+      <dsp:nvSpPr>
+        <dsp:cNvPr id="0" name=""/>
+        <dsp:cNvSpPr/>
+      </dsp:nvSpPr>
+      <dsp:spPr>
+        <a:xfrm>
+          <a:off x="1305073" y="490019"/>
+          <a:ext cx="96641" cy="362405"/>
+        </a:xfrm>
+        <a:custGeom>
+          <a:avLst/>
+          <a:gdLst/>
+          <a:ahLst/>
+          <a:cxnLst/>
+          <a:rect l="0" t="0" r="0" b="0"/>
+          <a:pathLst>
+            <a:path>
+              <a:moveTo>
+                <a:pt x="0" y="0"/>
+              </a:moveTo>
+              <a:lnTo>
+                <a:pt x="0" y="362405"/>
+              </a:lnTo>
+              <a:lnTo>
+                <a:pt x="96641" y="362405"/>
+              </a:lnTo>
+            </a:path>
+          </a:pathLst>
+        </a:custGeom>
+        <a:noFill/>
+        <a:ln w="25400" cap="flat" cmpd="sng" algn="ctr">
+          <a:solidFill>
+            <a:schemeClr val="dk1">
+              <a:shade val="60000"/>
+              <a:hueOff val="0"/>
+              <a:satOff val="0"/>
+              <a:lumOff val="0"/>
+              <a:alphaOff val="0"/>
+            </a:schemeClr>
+          </a:solidFill>
+          <a:prstDash val="solid"/>
+        </a:ln>
+        <a:effectLst/>
+      </dsp:spPr>
+      <dsp:style>
+        <a:lnRef idx="2">
+          <a:scrgbClr r="0" g="0" b="0"/>
+        </a:lnRef>
+        <a:fillRef idx="0">
+          <a:scrgbClr r="0" g="0" b="0"/>
+        </a:fillRef>
+        <a:effectRef idx="0">
+          <a:scrgbClr r="0" g="0" b="0"/>
+        </a:effectRef>
+        <a:fontRef idx="minor"/>
+      </dsp:style>
+    </dsp:sp>
+    <dsp:sp modelId="{DC495A99-3CC3-4C44-9CD4-E19127F63245}">
+      <dsp:nvSpPr>
+        <dsp:cNvPr id="0" name=""/>
+        <dsp:cNvSpPr/>
+      </dsp:nvSpPr>
+      <dsp:spPr>
+        <a:xfrm>
+          <a:off x="1401715" y="610821"/>
+          <a:ext cx="773132" cy="483207"/>
+        </a:xfrm>
+        <a:prstGeom prst="roundRect">
+          <a:avLst>
+            <a:gd name="adj" fmla="val 10000"/>
+          </a:avLst>
+        </a:prstGeom>
+        <a:solidFill>
+          <a:schemeClr val="dk1">
+            <a:alpha val="90000"/>
+            <a:tint val="40000"/>
+            <a:hueOff val="0"/>
+            <a:satOff val="0"/>
+            <a:lumOff val="0"/>
+            <a:alphaOff val="0"/>
+          </a:schemeClr>
+        </a:solidFill>
+        <a:ln w="25400" cap="flat" cmpd="sng" algn="ctr">
+          <a:solidFill>
+            <a:schemeClr val="dk1">
+              <a:hueOff val="0"/>
+              <a:satOff val="0"/>
+              <a:lumOff val="0"/>
+              <a:alphaOff val="0"/>
+            </a:schemeClr>
+          </a:solidFill>
+          <a:prstDash val="solid"/>
+        </a:ln>
+        <a:effectLst/>
+      </dsp:spPr>
+      <dsp:style>
+        <a:lnRef idx="2">
+          <a:scrgbClr r="0" g="0" b="0"/>
+        </a:lnRef>
+        <a:fillRef idx="1">
+          <a:scrgbClr r="0" g="0" b="0"/>
+        </a:fillRef>
+        <a:effectRef idx="0">
+          <a:scrgbClr r="0" g="0" b="0"/>
+        </a:effectRef>
+        <a:fontRef idx="minor"/>
+      </dsp:style>
+      <dsp:txBody>
+        <a:bodyPr spcFirstLastPara="0" vert="horz" wrap="square" lIns="26670" tIns="17780" rIns="26670" bIns="17780" numCol="1" spcCol="1270" anchor="ctr" anchorCtr="0">
+          <a:noAutofit/>
+        </a:bodyPr>
+        <a:lstStyle/>
+        <a:p>
+          <a:pPr lvl="0" algn="ctr" defTabSz="622300">
+            <a:lnSpc>
+              <a:spcPct val="90000"/>
+            </a:lnSpc>
+            <a:spcBef>
+              <a:spcPct val="0"/>
+            </a:spcBef>
+            <a:spcAft>
+              <a:spcPct val="35000"/>
+            </a:spcAft>
+          </a:pPr>
+          <a:r>
+            <a:rPr lang="en-US" sz="1400" kern="1200" smtClean="0"/>
+            <a:t>2.8V-5.5V</a:t>
+          </a:r>
+          <a:endParaRPr lang="en-US" sz="1400" kern="1200" dirty="0"/>
+        </a:p>
+      </dsp:txBody>
+      <dsp:txXfrm>
+        <a:off x="1415868" y="624974"/>
+        <a:ext cx="744826" cy="454901"/>
+      </dsp:txXfrm>
+    </dsp:sp>
+    <dsp:sp modelId="{B22AED20-DDE9-4F27-98ED-852D664DEE50}">
+      <dsp:nvSpPr>
+        <dsp:cNvPr id="0" name=""/>
+        <dsp:cNvSpPr/>
+      </dsp:nvSpPr>
+      <dsp:spPr>
+        <a:xfrm>
+          <a:off x="1305073" y="490019"/>
+          <a:ext cx="96641" cy="966415"/>
+        </a:xfrm>
+        <a:custGeom>
+          <a:avLst/>
+          <a:gdLst/>
+          <a:ahLst/>
+          <a:cxnLst/>
+          <a:rect l="0" t="0" r="0" b="0"/>
+          <a:pathLst>
+            <a:path>
+              <a:moveTo>
+                <a:pt x="0" y="0"/>
+              </a:moveTo>
+              <a:lnTo>
+                <a:pt x="0" y="966415"/>
+              </a:lnTo>
+              <a:lnTo>
+                <a:pt x="96641" y="966415"/>
+              </a:lnTo>
+            </a:path>
+          </a:pathLst>
+        </a:custGeom>
+        <a:noFill/>
+        <a:ln w="25400" cap="flat" cmpd="sng" algn="ctr">
+          <a:solidFill>
+            <a:schemeClr val="dk1">
+              <a:shade val="60000"/>
+              <a:hueOff val="0"/>
+              <a:satOff val="0"/>
+              <a:lumOff val="0"/>
+              <a:alphaOff val="0"/>
+            </a:schemeClr>
+          </a:solidFill>
+          <a:prstDash val="solid"/>
+        </a:ln>
+        <a:effectLst/>
+      </dsp:spPr>
+      <dsp:style>
+        <a:lnRef idx="2">
+          <a:scrgbClr r="0" g="0" b="0"/>
+        </a:lnRef>
+        <a:fillRef idx="0">
+          <a:scrgbClr r="0" g="0" b="0"/>
+        </a:fillRef>
+        <a:effectRef idx="0">
+          <a:scrgbClr r="0" g="0" b="0"/>
+        </a:effectRef>
+        <a:fontRef idx="minor"/>
+      </dsp:style>
+    </dsp:sp>
+    <dsp:sp modelId="{222E0677-6280-4BEE-9943-9B6567E1B4A1}">
+      <dsp:nvSpPr>
+        <dsp:cNvPr id="0" name=""/>
+        <dsp:cNvSpPr/>
+      </dsp:nvSpPr>
+      <dsp:spPr>
+        <a:xfrm>
+          <a:off x="1401715" y="1214830"/>
+          <a:ext cx="773132" cy="483207"/>
+        </a:xfrm>
+        <a:prstGeom prst="roundRect">
+          <a:avLst>
+            <a:gd name="adj" fmla="val 10000"/>
+          </a:avLst>
+        </a:prstGeom>
+        <a:solidFill>
+          <a:schemeClr val="dk1">
+            <a:alpha val="90000"/>
+            <a:tint val="40000"/>
+            <a:hueOff val="0"/>
+            <a:satOff val="0"/>
+            <a:lumOff val="0"/>
+            <a:alphaOff val="0"/>
+          </a:schemeClr>
+        </a:solidFill>
+        <a:ln w="25400" cap="flat" cmpd="sng" algn="ctr">
+          <a:solidFill>
+            <a:schemeClr val="dk1">
+              <a:hueOff val="0"/>
+              <a:satOff val="0"/>
+              <a:lumOff val="0"/>
+              <a:alphaOff val="0"/>
+            </a:schemeClr>
+          </a:solidFill>
+          <a:prstDash val="solid"/>
+        </a:ln>
+        <a:effectLst/>
+      </dsp:spPr>
+      <dsp:style>
+        <a:lnRef idx="2">
+          <a:scrgbClr r="0" g="0" b="0"/>
+        </a:lnRef>
+        <a:fillRef idx="1">
+          <a:scrgbClr r="0" g="0" b="0"/>
+        </a:fillRef>
+        <a:effectRef idx="0">
+          <a:scrgbClr r="0" g="0" b="0"/>
+        </a:effectRef>
+        <a:fontRef idx="minor"/>
+      </dsp:style>
+      <dsp:txBody>
+        <a:bodyPr spcFirstLastPara="0" vert="horz" wrap="square" lIns="26670" tIns="17780" rIns="26670" bIns="17780" numCol="1" spcCol="1270" anchor="ctr" anchorCtr="0">
+          <a:noAutofit/>
+        </a:bodyPr>
+        <a:lstStyle/>
+        <a:p>
+          <a:pPr lvl="0" algn="ctr" defTabSz="622300">
+            <a:lnSpc>
+              <a:spcPct val="90000"/>
+            </a:lnSpc>
+            <a:spcBef>
+              <a:spcPct val="0"/>
+            </a:spcBef>
+            <a:spcAft>
+              <a:spcPct val="35000"/>
+            </a:spcAft>
+          </a:pPr>
+          <a:r>
+            <a:rPr lang="en-US" sz="1400" kern="1200" dirty="0" smtClean="0"/>
+            <a:t>3.3V</a:t>
+          </a:r>
+          <a:endParaRPr lang="en-US" sz="1400" kern="1200" dirty="0"/>
+        </a:p>
+      </dsp:txBody>
+      <dsp:txXfrm>
+        <a:off x="1415868" y="1228983"/>
+        <a:ext cx="744826" cy="454901"/>
+      </dsp:txXfrm>
+    </dsp:sp>
+    <dsp:sp modelId="{F7D85594-4DA5-4940-BCB2-EDEAB36F297A}">
+      <dsp:nvSpPr>
+        <dsp:cNvPr id="0" name=""/>
+        <dsp:cNvSpPr/>
+      </dsp:nvSpPr>
+      <dsp:spPr>
+        <a:xfrm>
+          <a:off x="1305073" y="490019"/>
+          <a:ext cx="96641" cy="1570425"/>
+        </a:xfrm>
+        <a:custGeom>
+          <a:avLst/>
+          <a:gdLst/>
+          <a:ahLst/>
+          <a:cxnLst/>
+          <a:rect l="0" t="0" r="0" b="0"/>
+          <a:pathLst>
+            <a:path>
+              <a:moveTo>
+                <a:pt x="0" y="0"/>
+              </a:moveTo>
+              <a:lnTo>
+                <a:pt x="0" y="1570425"/>
+              </a:lnTo>
+              <a:lnTo>
+                <a:pt x="96641" y="1570425"/>
+              </a:lnTo>
+            </a:path>
+          </a:pathLst>
+        </a:custGeom>
+        <a:noFill/>
+        <a:ln w="25400" cap="flat" cmpd="sng" algn="ctr">
+          <a:solidFill>
+            <a:schemeClr val="dk1">
+              <a:shade val="60000"/>
+              <a:hueOff val="0"/>
+              <a:satOff val="0"/>
+              <a:lumOff val="0"/>
+              <a:alphaOff val="0"/>
+            </a:schemeClr>
+          </a:solidFill>
+          <a:prstDash val="solid"/>
+        </a:ln>
+        <a:effectLst/>
+      </dsp:spPr>
+      <dsp:style>
+        <a:lnRef idx="2">
+          <a:scrgbClr r="0" g="0" b="0"/>
+        </a:lnRef>
+        <a:fillRef idx="0">
+          <a:scrgbClr r="0" g="0" b="0"/>
+        </a:fillRef>
+        <a:effectRef idx="0">
+          <a:scrgbClr r="0" g="0" b="0"/>
+        </a:effectRef>
+        <a:fontRef idx="minor"/>
+      </dsp:style>
+    </dsp:sp>
+    <dsp:sp modelId="{14BE7BAD-7DEF-4568-B44D-40A60342DD0A}">
+      <dsp:nvSpPr>
+        <dsp:cNvPr id="0" name=""/>
+        <dsp:cNvSpPr/>
+      </dsp:nvSpPr>
+      <dsp:spPr>
+        <a:xfrm>
+          <a:off x="1401715" y="1818840"/>
+          <a:ext cx="773132" cy="483207"/>
+        </a:xfrm>
+        <a:prstGeom prst="roundRect">
+          <a:avLst>
+            <a:gd name="adj" fmla="val 10000"/>
+          </a:avLst>
+        </a:prstGeom>
+        <a:solidFill>
+          <a:schemeClr val="dk1">
+            <a:alpha val="90000"/>
+            <a:tint val="40000"/>
+            <a:hueOff val="0"/>
+            <a:satOff val="0"/>
+            <a:lumOff val="0"/>
+            <a:alphaOff val="0"/>
+          </a:schemeClr>
+        </a:solidFill>
+        <a:ln w="25400" cap="flat" cmpd="sng" algn="ctr">
+          <a:solidFill>
+            <a:schemeClr val="dk1">
+              <a:hueOff val="0"/>
+              <a:satOff val="0"/>
+              <a:lumOff val="0"/>
+              <a:alphaOff val="0"/>
+            </a:schemeClr>
+          </a:solidFill>
+          <a:prstDash val="solid"/>
+        </a:ln>
+        <a:effectLst/>
+      </dsp:spPr>
+      <dsp:style>
+        <a:lnRef idx="2">
+          <a:scrgbClr r="0" g="0" b="0"/>
+        </a:lnRef>
+        <a:fillRef idx="1">
+          <a:scrgbClr r="0" g="0" b="0"/>
+        </a:fillRef>
+        <a:effectRef idx="0">
+          <a:scrgbClr r="0" g="0" b="0"/>
+        </a:effectRef>
+        <a:fontRef idx="minor"/>
+      </dsp:style>
+      <dsp:txBody>
+        <a:bodyPr spcFirstLastPara="0" vert="horz" wrap="square" lIns="26670" tIns="17780" rIns="26670" bIns="17780" numCol="1" spcCol="1270" anchor="ctr" anchorCtr="0">
+          <a:noAutofit/>
+        </a:bodyPr>
+        <a:lstStyle/>
+        <a:p>
+          <a:pPr lvl="0" algn="ctr" defTabSz="622300">
+            <a:lnSpc>
+              <a:spcPct val="90000"/>
+            </a:lnSpc>
+            <a:spcBef>
+              <a:spcPct val="0"/>
+            </a:spcBef>
+            <a:spcAft>
+              <a:spcPct val="35000"/>
+            </a:spcAft>
+          </a:pPr>
+          <a:r>
+            <a:rPr lang="en-US" sz="1400" kern="1200" dirty="0" smtClean="0"/>
+            <a:t>1.5V</a:t>
+          </a:r>
+          <a:endParaRPr lang="en-US" sz="1400" kern="1200" dirty="0"/>
+        </a:p>
+      </dsp:txBody>
+      <dsp:txXfrm>
+        <a:off x="1415868" y="1832993"/>
+        <a:ext cx="744826" cy="454901"/>
+      </dsp:txXfrm>
+    </dsp:sp>
+    <dsp:sp modelId="{9EE9022C-A1A4-4896-812C-BF67B355D3FC}">
+      <dsp:nvSpPr>
+        <dsp:cNvPr id="0" name=""/>
+        <dsp:cNvSpPr/>
+      </dsp:nvSpPr>
+      <dsp:spPr>
+        <a:xfrm>
+          <a:off x="2416451" y="6811"/>
+          <a:ext cx="966415" cy="483207"/>
+        </a:xfrm>
+        <a:prstGeom prst="roundRect">
+          <a:avLst>
+            <a:gd name="adj" fmla="val 10000"/>
+          </a:avLst>
+        </a:prstGeom>
+        <a:solidFill>
+          <a:schemeClr val="lt1">
+            <a:hueOff val="0"/>
+            <a:satOff val="0"/>
+            <a:lumOff val="0"/>
+            <a:alphaOff val="0"/>
+          </a:schemeClr>
+        </a:solidFill>
+        <a:ln w="25400" cap="flat" cmpd="sng" algn="ctr">
+          <a:solidFill>
+            <a:schemeClr val="dk1">
+              <a:shade val="80000"/>
+              <a:hueOff val="0"/>
+              <a:satOff val="0"/>
+              <a:lumOff val="0"/>
+              <a:alphaOff val="0"/>
+            </a:schemeClr>
+          </a:solidFill>
+          <a:prstDash val="solid"/>
+        </a:ln>
+        <a:effectLst/>
+      </dsp:spPr>
+      <dsp:style>
+        <a:lnRef idx="2">
+          <a:scrgbClr r="0" g="0" b="0"/>
+        </a:lnRef>
+        <a:fillRef idx="1">
+          <a:scrgbClr r="0" g="0" b="0"/>
+        </a:fillRef>
+        <a:effectRef idx="0">
+          <a:scrgbClr r="0" g="0" b="0"/>
+        </a:effectRef>
+        <a:fontRef idx="minor">
+          <a:schemeClr val="lt1"/>
+        </a:fontRef>
+      </dsp:style>
+      <dsp:txBody>
+        <a:bodyPr spcFirstLastPara="0" vert="horz" wrap="square" lIns="26670" tIns="17780" rIns="26670" bIns="17780" numCol="1" spcCol="1270" anchor="ctr" anchorCtr="0">
+          <a:noAutofit/>
+        </a:bodyPr>
+        <a:lstStyle/>
+        <a:p>
+          <a:pPr lvl="0" algn="ctr" defTabSz="622300">
+            <a:lnSpc>
+              <a:spcPct val="90000"/>
+            </a:lnSpc>
+            <a:spcBef>
+              <a:spcPct val="0"/>
+            </a:spcBef>
+            <a:spcAft>
+              <a:spcPct val="35000"/>
+            </a:spcAft>
+          </a:pPr>
+          <a:r>
+            <a:rPr lang="en-US" sz="1400" kern="1200" dirty="0" smtClean="0"/>
+            <a:t>Analog</a:t>
+          </a:r>
+          <a:endParaRPr lang="en-US" sz="1400" kern="1200" dirty="0"/>
+        </a:p>
+      </dsp:txBody>
+      <dsp:txXfrm>
+        <a:off x="2430604" y="20964"/>
+        <a:ext cx="938109" cy="454901"/>
+      </dsp:txXfrm>
+    </dsp:sp>
+    <dsp:sp modelId="{A4DF48BC-C80A-40AA-8875-46B7EC62C64E}">
+      <dsp:nvSpPr>
+        <dsp:cNvPr id="0" name=""/>
+        <dsp:cNvSpPr/>
+      </dsp:nvSpPr>
+      <dsp:spPr>
+        <a:xfrm>
+          <a:off x="2513093" y="490019"/>
+          <a:ext cx="96641" cy="362405"/>
+        </a:xfrm>
+        <a:custGeom>
+          <a:avLst/>
+          <a:gdLst/>
+          <a:ahLst/>
+          <a:cxnLst/>
+          <a:rect l="0" t="0" r="0" b="0"/>
+          <a:pathLst>
+            <a:path>
+              <a:moveTo>
+                <a:pt x="0" y="0"/>
+              </a:moveTo>
+              <a:lnTo>
+                <a:pt x="0" y="362405"/>
+              </a:lnTo>
+              <a:lnTo>
+                <a:pt x="96641" y="362405"/>
+              </a:lnTo>
+            </a:path>
+          </a:pathLst>
+        </a:custGeom>
+        <a:noFill/>
+        <a:ln w="25400" cap="flat" cmpd="sng" algn="ctr">
+          <a:solidFill>
+            <a:schemeClr val="dk1">
+              <a:shade val="60000"/>
+              <a:hueOff val="0"/>
+              <a:satOff val="0"/>
+              <a:lumOff val="0"/>
+              <a:alphaOff val="0"/>
+            </a:schemeClr>
+          </a:solidFill>
+          <a:prstDash val="solid"/>
+        </a:ln>
+        <a:effectLst/>
+      </dsp:spPr>
+      <dsp:style>
+        <a:lnRef idx="2">
+          <a:scrgbClr r="0" g="0" b="0"/>
+        </a:lnRef>
+        <a:fillRef idx="0">
+          <a:scrgbClr r="0" g="0" b="0"/>
+        </a:fillRef>
+        <a:effectRef idx="0">
+          <a:scrgbClr r="0" g="0" b="0"/>
+        </a:effectRef>
+        <a:fontRef idx="minor"/>
+      </dsp:style>
+    </dsp:sp>
+    <dsp:sp modelId="{8B2E1D33-2D90-409B-91CE-DB815A9F16CD}">
+      <dsp:nvSpPr>
+        <dsp:cNvPr id="0" name=""/>
+        <dsp:cNvSpPr/>
+      </dsp:nvSpPr>
+      <dsp:spPr>
+        <a:xfrm>
+          <a:off x="2609734" y="610821"/>
+          <a:ext cx="773132" cy="483207"/>
+        </a:xfrm>
+        <a:prstGeom prst="roundRect">
+          <a:avLst>
+            <a:gd name="adj" fmla="val 10000"/>
+          </a:avLst>
+        </a:prstGeom>
+        <a:solidFill>
+          <a:schemeClr val="dk1">
+            <a:alpha val="90000"/>
+            <a:tint val="40000"/>
+            <a:hueOff val="0"/>
+            <a:satOff val="0"/>
+            <a:lumOff val="0"/>
+            <a:alphaOff val="0"/>
+          </a:schemeClr>
+        </a:solidFill>
+        <a:ln w="25400" cap="flat" cmpd="sng" algn="ctr">
+          <a:solidFill>
+            <a:schemeClr val="dk1">
+              <a:hueOff val="0"/>
+              <a:satOff val="0"/>
+              <a:lumOff val="0"/>
+              <a:alphaOff val="0"/>
+            </a:schemeClr>
+          </a:solidFill>
+          <a:prstDash val="solid"/>
+        </a:ln>
+        <a:effectLst/>
+      </dsp:spPr>
+      <dsp:style>
+        <a:lnRef idx="2">
+          <a:scrgbClr r="0" g="0" b="0"/>
+        </a:lnRef>
+        <a:fillRef idx="1">
+          <a:scrgbClr r="0" g="0" b="0"/>
+        </a:fillRef>
+        <a:effectRef idx="0">
+          <a:scrgbClr r="0" g="0" b="0"/>
+        </a:effectRef>
+        <a:fontRef idx="minor"/>
+      </dsp:style>
+      <dsp:txBody>
+        <a:bodyPr spcFirstLastPara="0" vert="horz" wrap="square" lIns="26670" tIns="17780" rIns="26670" bIns="17780" numCol="1" spcCol="1270" anchor="ctr" anchorCtr="0">
+          <a:noAutofit/>
+        </a:bodyPr>
+        <a:lstStyle/>
+        <a:p>
+          <a:pPr lvl="0" algn="ctr" defTabSz="622300">
+            <a:lnSpc>
+              <a:spcPct val="90000"/>
+            </a:lnSpc>
+            <a:spcBef>
+              <a:spcPct val="0"/>
+            </a:spcBef>
+            <a:spcAft>
+              <a:spcPct val="35000"/>
+            </a:spcAft>
+          </a:pPr>
+          <a:r>
+            <a:rPr lang="en-US" sz="1400" kern="1200" dirty="0" smtClean="0"/>
+            <a:t>3.3V</a:t>
+          </a:r>
+          <a:endParaRPr lang="en-US" sz="1400" kern="1200" dirty="0"/>
+        </a:p>
+      </dsp:txBody>
+      <dsp:txXfrm>
+        <a:off x="2623887" y="624974"/>
+        <a:ext cx="744826" cy="454901"/>
+      </dsp:txXfrm>
+    </dsp:sp>
+    <dsp:sp modelId="{7CA3DDAE-BF88-4855-AC2F-E7A514981FE1}">
+      <dsp:nvSpPr>
+        <dsp:cNvPr id="0" name=""/>
+        <dsp:cNvSpPr/>
+      </dsp:nvSpPr>
+      <dsp:spPr>
+        <a:xfrm>
+          <a:off x="2513093" y="490019"/>
+          <a:ext cx="96641" cy="966415"/>
+        </a:xfrm>
+        <a:custGeom>
+          <a:avLst/>
+          <a:gdLst/>
+          <a:ahLst/>
+          <a:cxnLst/>
+          <a:rect l="0" t="0" r="0" b="0"/>
+          <a:pathLst>
+            <a:path>
+              <a:moveTo>
+                <a:pt x="0" y="0"/>
+              </a:moveTo>
+              <a:lnTo>
+                <a:pt x="0" y="966415"/>
+              </a:lnTo>
+              <a:lnTo>
+                <a:pt x="96641" y="966415"/>
+              </a:lnTo>
+            </a:path>
+          </a:pathLst>
+        </a:custGeom>
+        <a:noFill/>
+        <a:ln w="25400" cap="flat" cmpd="sng" algn="ctr">
+          <a:solidFill>
+            <a:schemeClr val="dk1">
+              <a:shade val="60000"/>
+              <a:hueOff val="0"/>
+              <a:satOff val="0"/>
+              <a:lumOff val="0"/>
+              <a:alphaOff val="0"/>
+            </a:schemeClr>
+          </a:solidFill>
+          <a:prstDash val="solid"/>
+        </a:ln>
+        <a:effectLst/>
+      </dsp:spPr>
+      <dsp:style>
+        <a:lnRef idx="2">
+          <a:scrgbClr r="0" g="0" b="0"/>
+        </a:lnRef>
+        <a:fillRef idx="0">
+          <a:scrgbClr r="0" g="0" b="0"/>
+        </a:fillRef>
+        <a:effectRef idx="0">
+          <a:scrgbClr r="0" g="0" b="0"/>
+        </a:effectRef>
+        <a:fontRef idx="minor"/>
+      </dsp:style>
+    </dsp:sp>
+    <dsp:sp modelId="{950149A1-B038-49CC-8E04-F0059BEBE2CB}">
+      <dsp:nvSpPr>
+        <dsp:cNvPr id="0" name=""/>
+        <dsp:cNvSpPr/>
+      </dsp:nvSpPr>
+      <dsp:spPr>
+        <a:xfrm>
+          <a:off x="2609734" y="1214830"/>
+          <a:ext cx="773132" cy="483207"/>
+        </a:xfrm>
+        <a:prstGeom prst="roundRect">
+          <a:avLst>
+            <a:gd name="adj" fmla="val 10000"/>
+          </a:avLst>
+        </a:prstGeom>
+        <a:solidFill>
+          <a:schemeClr val="dk1">
+            <a:alpha val="90000"/>
+            <a:tint val="40000"/>
+            <a:hueOff val="0"/>
+            <a:satOff val="0"/>
+            <a:lumOff val="0"/>
+            <a:alphaOff val="0"/>
+          </a:schemeClr>
+        </a:solidFill>
+        <a:ln w="25400" cap="flat" cmpd="sng" algn="ctr">
+          <a:solidFill>
+            <a:schemeClr val="dk1">
+              <a:hueOff val="0"/>
+              <a:satOff val="0"/>
+              <a:lumOff val="0"/>
+              <a:alphaOff val="0"/>
+            </a:schemeClr>
+          </a:solidFill>
+          <a:prstDash val="solid"/>
+        </a:ln>
+        <a:effectLst/>
+      </dsp:spPr>
+      <dsp:style>
+        <a:lnRef idx="2">
+          <a:scrgbClr r="0" g="0" b="0"/>
+        </a:lnRef>
+        <a:fillRef idx="1">
+          <a:scrgbClr r="0" g="0" b="0"/>
+        </a:fillRef>
+        <a:effectRef idx="0">
+          <a:scrgbClr r="0" g="0" b="0"/>
+        </a:effectRef>
+        <a:fontRef idx="minor"/>
+      </dsp:style>
+      <dsp:txBody>
+        <a:bodyPr spcFirstLastPara="0" vert="horz" wrap="square" lIns="26670" tIns="17780" rIns="26670" bIns="17780" numCol="1" spcCol="1270" anchor="ctr" anchorCtr="0">
+          <a:noAutofit/>
+        </a:bodyPr>
+        <a:lstStyle/>
+        <a:p>
+          <a:pPr lvl="0" algn="ctr" defTabSz="622300">
+            <a:lnSpc>
+              <a:spcPct val="90000"/>
+            </a:lnSpc>
+            <a:spcBef>
+              <a:spcPct val="0"/>
+            </a:spcBef>
+            <a:spcAft>
+              <a:spcPct val="35000"/>
+            </a:spcAft>
+          </a:pPr>
+          <a:r>
+            <a:rPr lang="en-US" sz="1400" kern="1200" dirty="0" smtClean="0"/>
+            <a:t>1.5V</a:t>
+          </a:r>
+          <a:endParaRPr lang="en-US" sz="1400" kern="1200" dirty="0"/>
+        </a:p>
+      </dsp:txBody>
+      <dsp:txXfrm>
+        <a:off x="2623887" y="1228983"/>
+        <a:ext cx="744826" cy="454901"/>
+      </dsp:txXfrm>
+    </dsp:sp>
   </dsp:spTree>
 </dsp:drawing>
 </file>
@@ -3031,7 +4093,7 @@
             <a:fld id="{DE3582C7-6B08-4D4A-BF1B-6FA237430C58}" type="datetimeFigureOut">
               <a:rPr lang="en-US" smtClean="0"/>
               <a:pPr/>
-              <a:t>5/26/2011</a:t>
+              <a:t>2/14/2012</a:t>
             </a:fld>
             <a:endParaRPr lang="en-US"/>
           </a:p>
@@ -3200,6 +4262,11 @@
         </p:txBody>
       </p:sp>
     </p:spTree>
+    <p:extLst>
+      <p:ext uri="{BB962C8B-B14F-4D97-AF65-F5344CB8AC3E}">
+        <p14:creationId xmlns:p14="http://schemas.microsoft.com/office/powerpoint/2010/main" val="1344092955"/>
+      </p:ext>
+    </p:extLst>
   </p:cSld>
   <p:clrMap bg1="lt1" tx1="dk1" bg2="lt2" tx2="dk2" accent1="accent1" accent2="accent2" accent3="accent3" accent4="accent4" accent5="accent5" accent6="accent6" hlink="hlink" folHlink="folHlink"/>
   <p:notesStyle>
@@ -3561,7 +4628,7 @@
             <a:fld id="{1D8BD707-D9CF-40AE-B4C6-C98DA3205C09}" type="datetimeFigureOut">
               <a:rPr lang="en-US" smtClean="0"/>
               <a:pPr/>
-              <a:t>5/26/2011</a:t>
+              <a:t>2/14/2012</a:t>
             </a:fld>
             <a:endParaRPr lang="en-US"/>
           </a:p>
@@ -3728,7 +4795,7 @@
             <a:fld id="{1D8BD707-D9CF-40AE-B4C6-C98DA3205C09}" type="datetimeFigureOut">
               <a:rPr lang="en-US" smtClean="0"/>
               <a:pPr/>
-              <a:t>5/26/2011</a:t>
+              <a:t>2/14/2012</a:t>
             </a:fld>
             <a:endParaRPr lang="en-US"/>
           </a:p>
@@ -3905,7 +4972,7 @@
             <a:fld id="{1D8BD707-D9CF-40AE-B4C6-C98DA3205C09}" type="datetimeFigureOut">
               <a:rPr lang="en-US" smtClean="0"/>
               <a:pPr/>
-              <a:t>5/26/2011</a:t>
+              <a:t>2/14/2012</a:t>
             </a:fld>
             <a:endParaRPr lang="en-US"/>
           </a:p>
@@ -4072,7 +5139,7 @@
             <a:fld id="{1D8BD707-D9CF-40AE-B4C6-C98DA3205C09}" type="datetimeFigureOut">
               <a:rPr lang="en-US" smtClean="0"/>
               <a:pPr/>
-              <a:t>5/26/2011</a:t>
+              <a:t>2/14/2012</a:t>
             </a:fld>
             <a:endParaRPr lang="en-US"/>
           </a:p>
@@ -4315,7 +5382,7 @@
             <a:fld id="{1D8BD707-D9CF-40AE-B4C6-C98DA3205C09}" type="datetimeFigureOut">
               <a:rPr lang="en-US" smtClean="0"/>
               <a:pPr/>
-              <a:t>5/26/2011</a:t>
+              <a:t>2/14/2012</a:t>
             </a:fld>
             <a:endParaRPr lang="en-US"/>
           </a:p>
@@ -4600,7 +5667,7 @@
             <a:fld id="{1D8BD707-D9CF-40AE-B4C6-C98DA3205C09}" type="datetimeFigureOut">
               <a:rPr lang="en-US" smtClean="0"/>
               <a:pPr/>
-              <a:t>5/26/2011</a:t>
+              <a:t>2/14/2012</a:t>
             </a:fld>
             <a:endParaRPr lang="en-US"/>
           </a:p>
@@ -5019,7 +6086,7 @@
             <a:fld id="{1D8BD707-D9CF-40AE-B4C6-C98DA3205C09}" type="datetimeFigureOut">
               <a:rPr lang="en-US" smtClean="0"/>
               <a:pPr/>
-              <a:t>5/26/2011</a:t>
+              <a:t>2/14/2012</a:t>
             </a:fld>
             <a:endParaRPr lang="en-US"/>
           </a:p>
@@ -5134,7 +6201,7 @@
             <a:fld id="{1D8BD707-D9CF-40AE-B4C6-C98DA3205C09}" type="datetimeFigureOut">
               <a:rPr lang="en-US" smtClean="0"/>
               <a:pPr/>
-              <a:t>5/26/2011</a:t>
+              <a:t>2/14/2012</a:t>
             </a:fld>
             <a:endParaRPr lang="en-US"/>
           </a:p>
@@ -5226,7 +6293,7 @@
             <a:fld id="{1D8BD707-D9CF-40AE-B4C6-C98DA3205C09}" type="datetimeFigureOut">
               <a:rPr lang="en-US" smtClean="0"/>
               <a:pPr/>
-              <a:t>5/26/2011</a:t>
+              <a:t>2/14/2012</a:t>
             </a:fld>
             <a:endParaRPr lang="en-US"/>
           </a:p>
@@ -5500,7 +6567,7 @@
             <a:fld id="{1D8BD707-D9CF-40AE-B4C6-C98DA3205C09}" type="datetimeFigureOut">
               <a:rPr lang="en-US" smtClean="0"/>
               <a:pPr/>
-              <a:t>5/26/2011</a:t>
+              <a:t>2/14/2012</a:t>
             </a:fld>
             <a:endParaRPr lang="en-US"/>
           </a:p>
@@ -5750,7 +6817,7 @@
             <a:fld id="{1D8BD707-D9CF-40AE-B4C6-C98DA3205C09}" type="datetimeFigureOut">
               <a:rPr lang="en-US" smtClean="0"/>
               <a:pPr/>
-              <a:t>5/26/2011</a:t>
+              <a:t>2/14/2012</a:t>
             </a:fld>
             <a:endParaRPr lang="en-US"/>
           </a:p>
@@ -5960,7 +7027,7 @@
             <a:fld id="{1D8BD707-D9CF-40AE-B4C6-C98DA3205C09}" type="datetimeFigureOut">
               <a:rPr lang="en-US" smtClean="0"/>
               <a:pPr/>
-              <a:t>5/26/2011</a:t>
+              <a:t>2/14/2012</a:t>
             </a:fld>
             <a:endParaRPr lang="en-US"/>
           </a:p>
@@ -8820,6 +9887,120 @@
           </a:fontRef>
         </p:style>
       </p:cxnSp>
+      <p:sp>
+        <p:nvSpPr>
+          <p:cNvPr id="66" name="Rectangle 65"/>
+          <p:cNvSpPr/>
+          <p:nvPr/>
+        </p:nvSpPr>
+        <p:spPr>
+          <a:xfrm>
+            <a:off x="2702813" y="4297680"/>
+            <a:ext cx="389851" cy="307777"/>
+          </a:xfrm>
+          <a:prstGeom prst="rect">
+            <a:avLst/>
+          </a:prstGeom>
+        </p:spPr>
+        <p:txBody>
+          <a:bodyPr wrap="none">
+            <a:spAutoFit/>
+          </a:bodyPr>
+          <a:lstStyle/>
+          <a:p>
+            <a:pPr algn="ctr"/>
+            <a:r>
+              <a:rPr lang="en-US" sz="1400" dirty="0" smtClean="0">
+                <a:latin typeface="Tahoma" pitchFamily="34" charset="0"/>
+                <a:ea typeface="Tahoma" pitchFamily="34" charset="0"/>
+                <a:cs typeface="Tahoma" pitchFamily="34" charset="0"/>
+              </a:rPr>
+              <a:t>5V</a:t>
+            </a:r>
+            <a:endParaRPr lang="en-US" sz="1400" dirty="0">
+              <a:latin typeface="Tahoma" pitchFamily="34" charset="0"/>
+              <a:ea typeface="Tahoma" pitchFamily="34" charset="0"/>
+              <a:cs typeface="Tahoma" pitchFamily="34" charset="0"/>
+            </a:endParaRPr>
+          </a:p>
+        </p:txBody>
+      </p:sp>
+      <p:sp>
+        <p:nvSpPr>
+          <p:cNvPr id="67" name="Rectangle 66"/>
+          <p:cNvSpPr/>
+          <p:nvPr/>
+        </p:nvSpPr>
+        <p:spPr>
+          <a:xfrm>
+            <a:off x="2702813" y="4663440"/>
+            <a:ext cx="389851" cy="307777"/>
+          </a:xfrm>
+          <a:prstGeom prst="rect">
+            <a:avLst/>
+          </a:prstGeom>
+        </p:spPr>
+        <p:txBody>
+          <a:bodyPr wrap="none">
+            <a:spAutoFit/>
+          </a:bodyPr>
+          <a:lstStyle/>
+          <a:p>
+            <a:pPr algn="ctr"/>
+            <a:r>
+              <a:rPr lang="en-US" sz="1400" dirty="0" smtClean="0">
+                <a:latin typeface="Tahoma" pitchFamily="34" charset="0"/>
+                <a:ea typeface="Tahoma" pitchFamily="34" charset="0"/>
+                <a:cs typeface="Tahoma" pitchFamily="34" charset="0"/>
+              </a:rPr>
+              <a:t>5V</a:t>
+            </a:r>
+            <a:endParaRPr lang="en-US" sz="1400" dirty="0">
+              <a:latin typeface="Tahoma" pitchFamily="34" charset="0"/>
+              <a:ea typeface="Tahoma" pitchFamily="34" charset="0"/>
+              <a:cs typeface="Tahoma" pitchFamily="34" charset="0"/>
+            </a:endParaRPr>
+          </a:p>
+        </p:txBody>
+      </p:sp>
+      <p:sp>
+        <p:nvSpPr>
+          <p:cNvPr id="69" name="Rectangle 68"/>
+          <p:cNvSpPr/>
+          <p:nvPr/>
+        </p:nvSpPr>
+        <p:spPr>
+          <a:xfrm>
+            <a:off x="2626672" y="5029200"/>
+            <a:ext cx="542135" cy="307777"/>
+          </a:xfrm>
+          <a:prstGeom prst="rect">
+            <a:avLst/>
+          </a:prstGeom>
+        </p:spPr>
+        <p:txBody>
+          <a:bodyPr wrap="none">
+            <a:spAutoFit/>
+          </a:bodyPr>
+          <a:lstStyle/>
+          <a:p>
+            <a:pPr algn="ctr"/>
+            <a:r>
+              <a:rPr lang="en-US" sz="1400" dirty="0" smtClean="0">
+                <a:latin typeface="Tahoma" pitchFamily="34" charset="0"/>
+                <a:ea typeface="Tahoma" pitchFamily="34" charset="0"/>
+                <a:cs typeface="Tahoma" pitchFamily="34" charset="0"/>
+              </a:rPr>
+              <a:t>3.6V</a:t>
+            </a:r>
+            <a:endParaRPr lang="en-US" sz="1400" dirty="0">
+              <a:latin typeface="Tahoma" pitchFamily="34" charset="0"/>
+              <a:ea typeface="Tahoma" pitchFamily="34" charset="0"/>
+              <a:cs typeface="Tahoma" pitchFamily="34" charset="0"/>
+            </a:endParaRPr>
+          </a:p>
+        </p:txBody>
+      </p:sp>
     </p:spTree>
   </p:cSld>
   <p:clrMapOvr>

</xml_diff>